<commit_message>
Moved definition of IRR ratios to model initialization such that you do not need to run the training section of code
</commit_message>
<xml_diff>
--- a/Presentation/DL based CS under IQ imbalance for Channel Estimation.pptx
+++ b/Presentation/DL based CS under IQ imbalance for Channel Estimation.pptx
@@ -205,7 +205,7 @@
           <a:p>
             <a:fld id="{4B0057EB-7613-40BF-BC38-C4404E475540}" type="datetimeFigureOut">
               <a:rPr lang="nl-NL" smtClean="0"/>
-              <a:t>11-4-2025</a:t>
+              <a:t>14-4-2025</a:t>
             </a:fld>
             <a:endParaRPr lang="nl-NL"/>
           </a:p>
@@ -2898,7 +2898,7 @@
           <a:p>
             <a:fld id="{5B227193-D8F5-48A7-B0D3-6DAD1F4F8E92}" type="datetime1">
               <a:rPr lang="nl-NL" smtClean="0"/>
-              <a:t>11-4-2025</a:t>
+              <a:t>14-4-2025</a:t>
             </a:fld>
             <a:endParaRPr lang="en-GB" dirty="0"/>
           </a:p>
@@ -3163,7 +3163,7 @@
           <a:p>
             <a:fld id="{84F67F68-8730-46D4-B97A-B14B07754ED5}" type="datetime1">
               <a:rPr lang="nl-NL" smtClean="0"/>
-              <a:t>11-4-2025</a:t>
+              <a:t>14-4-2025</a:t>
             </a:fld>
             <a:endParaRPr lang="en-GB" dirty="0"/>
           </a:p>
@@ -8954,7 +8954,7 @@
           <a:p>
             <a:fld id="{8356D135-3DCC-4F43-956C-8E084B5B3B73}" type="datetime1">
               <a:rPr lang="nl-NL" smtClean="0"/>
-              <a:t>11-4-2025</a:t>
+              <a:t>14-4-2025</a:t>
             </a:fld>
             <a:endParaRPr lang="en-GB" dirty="0"/>
           </a:p>
@@ -10448,7 +10448,7 @@
           <a:p>
             <a:fld id="{303B48DA-2759-4DC2-ADEB-419D18991E4A}" type="datetime1">
               <a:rPr lang="nl-NL" smtClean="0"/>
-              <a:t>11-4-2025</a:t>
+              <a:t>14-4-2025</a:t>
             </a:fld>
             <a:endParaRPr lang="en-GB" dirty="0"/>
           </a:p>
@@ -15118,7 +15118,7 @@
           <a:p>
             <a:fld id="{86CF0BC4-CAAA-4113-A44D-B077CA6D06A0}" type="datetime1">
               <a:rPr lang="nl-NL" smtClean="0"/>
-              <a:t>11-4-2025</a:t>
+              <a:t>14-4-2025</a:t>
             </a:fld>
             <a:endParaRPr lang="en-GB" dirty="0"/>
           </a:p>
@@ -17313,7 +17313,7 @@
           <a:p>
             <a:fld id="{190CA508-B273-4D53-A64E-FB05E270E0EA}" type="datetime1">
               <a:rPr lang="nl-NL" smtClean="0"/>
-              <a:t>11-4-2025</a:t>
+              <a:t>14-4-2025</a:t>
             </a:fld>
             <a:endParaRPr lang="en-GB" dirty="0"/>
           </a:p>
@@ -23354,7 +23354,7 @@
           <a:p>
             <a:fld id="{1BDEED87-6B56-4161-9E14-2FCC2CD9D2C7}" type="datetime1">
               <a:rPr lang="nl-NL" smtClean="0"/>
-              <a:t>11-4-2025</a:t>
+              <a:t>14-4-2025</a:t>
             </a:fld>
             <a:endParaRPr lang="en-GB" dirty="0"/>
           </a:p>
@@ -26373,7 +26373,7 @@
           <a:p>
             <a:fld id="{A70DA17A-8D2C-4A91-9743-4EE9C30B5D2E}" type="datetime1">
               <a:rPr lang="nl-NL" smtClean="0"/>
-              <a:t>11-4-2025</a:t>
+              <a:t>14-4-2025</a:t>
             </a:fld>
             <a:endParaRPr lang="en-GB" dirty="0"/>
           </a:p>
@@ -26668,7 +26668,7 @@
           <a:p>
             <a:fld id="{087A43E6-197A-4232-A775-7017A41F9758}" type="datetime1">
               <a:rPr lang="nl-NL" smtClean="0"/>
-              <a:t>11-4-2025</a:t>
+              <a:t>14-4-2025</a:t>
             </a:fld>
             <a:endParaRPr lang="en-GB" dirty="0"/>
           </a:p>
@@ -28462,7 +28462,7 @@
           <a:p>
             <a:fld id="{303B48DA-2759-4DC2-ADEB-419D18991E4A}" type="datetime1">
               <a:rPr lang="nl-NL" smtClean="0"/>
-              <a:t>11-4-2025</a:t>
+              <a:t>14-4-2025</a:t>
             </a:fld>
             <a:endParaRPr lang="en-GB" dirty="0"/>
           </a:p>
@@ -30562,7 +30562,7 @@
           <a:p>
             <a:fld id="{303B48DA-2759-4DC2-ADEB-419D18991E4A}" type="datetime1">
               <a:rPr lang="nl-NL" smtClean="0"/>
-              <a:t>11-4-2025</a:t>
+              <a:t>14-4-2025</a:t>
             </a:fld>
             <a:endParaRPr lang="en-GB" dirty="0"/>
           </a:p>
@@ -32849,7 +32849,7 @@
           <a:p>
             <a:fld id="{303B48DA-2759-4DC2-ADEB-419D18991E4A}" type="datetime1">
               <a:rPr lang="nl-NL" smtClean="0"/>
-              <a:t>11-4-2025</a:t>
+              <a:t>14-4-2025</a:t>
             </a:fld>
             <a:endParaRPr lang="en-GB" dirty="0"/>
           </a:p>
@@ -36327,7 +36327,7 @@
           <a:p>
             <a:fld id="{303B48DA-2759-4DC2-ADEB-419D18991E4A}" type="datetime1">
               <a:rPr lang="nl-NL" smtClean="0"/>
-              <a:t>11-4-2025</a:t>
+              <a:t>14-4-2025</a:t>
             </a:fld>
             <a:endParaRPr lang="en-GB" dirty="0"/>
           </a:p>
@@ -38356,7 +38356,7 @@
           <a:p>
             <a:fld id="{303B48DA-2759-4DC2-ADEB-419D18991E4A}" type="datetime1">
               <a:rPr lang="nl-NL" smtClean="0"/>
-              <a:t>11-4-2025</a:t>
+              <a:t>14-4-2025</a:t>
             </a:fld>
             <a:endParaRPr lang="en-GB" dirty="0"/>
           </a:p>
@@ -38493,7 +38493,7 @@
           <a:p>
             <a:fld id="{CDAA46D9-07E0-4E4E-BB12-6959CCFDC8FC}" type="datetime1">
               <a:rPr lang="nl-NL" smtClean="0"/>
-              <a:t>11-4-2025</a:t>
+              <a:t>14-4-2025</a:t>
             </a:fld>
             <a:endParaRPr lang="en-GB" dirty="0"/>
           </a:p>
@@ -38766,7 +38766,7 @@
           <a:p>
             <a:fld id="{94FF7FCF-C8DD-4806-ADA9-9CF3D5D11C5C}" type="datetime1">
               <a:rPr lang="nl-NL" smtClean="0"/>
-              <a:t>11-4-2025</a:t>
+              <a:t>14-4-2025</a:t>
             </a:fld>
             <a:endParaRPr lang="en-GB" dirty="0"/>
           </a:p>
@@ -39792,12 +39792,9 @@
 </file>
 
 <file path=customXml/item1.xml><?xml version="1.0" encoding="utf-8"?>
-<?mso-contentType ?>
-<FormTemplates xmlns="http://schemas.microsoft.com/sharepoint/v3/contenttype/forms">
-  <Display>DocumentLibraryForm</Display>
-  <Edit>DocumentLibraryForm</Edit>
-  <New>DocumentLibraryForm</New>
-</FormTemplates>
+<p:properties xmlns:p="http://schemas.microsoft.com/office/2006/metadata/properties" xmlns:xsi="http://www.w3.org/2001/XMLSchema-instance" xmlns:pc="http://schemas.microsoft.com/office/infopath/2007/PartnerControls">
+  <documentManagement/>
+</p:properties>
 </file>
 
 <file path=customXml/item2.xml><?xml version="1.0" encoding="utf-8"?>
@@ -39945,15 +39942,19 @@
 </file>
 
 <file path=customXml/item3.xml><?xml version="1.0" encoding="utf-8"?>
-<p:properties xmlns:p="http://schemas.microsoft.com/office/2006/metadata/properties" xmlns:xsi="http://www.w3.org/2001/XMLSchema-instance" xmlns:pc="http://schemas.microsoft.com/office/infopath/2007/PartnerControls">
-  <documentManagement/>
-</p:properties>
+<?mso-contentType ?>
+<FormTemplates xmlns="http://schemas.microsoft.com/sharepoint/v3/contenttype/forms">
+  <Display>DocumentLibraryForm</Display>
+  <Edit>DocumentLibraryForm</Edit>
+  <New>DocumentLibraryForm</New>
+</FormTemplates>
 </file>
 
 <file path=customXml/itemProps1.xml><?xml version="1.0" encoding="utf-8"?>
-<ds:datastoreItem xmlns:ds="http://schemas.openxmlformats.org/officeDocument/2006/customXml" ds:itemID="{FB1BE96A-004D-462B-9683-1ED8D109FF11}">
+<ds:datastoreItem xmlns:ds="http://schemas.openxmlformats.org/officeDocument/2006/customXml" ds:itemID="{6C60251D-6FF0-4793-A20E-73F86C34C07D}">
   <ds:schemaRefs>
-    <ds:schemaRef ds:uri="http://schemas.microsoft.com/sharepoint/v3/contenttype/forms"/>
+    <ds:schemaRef ds:uri="http://schemas.microsoft.com/office/2006/metadata/properties"/>
+    <ds:schemaRef ds:uri="http://schemas.microsoft.com/office/infopath/2007/PartnerControls"/>
   </ds:schemaRefs>
 </ds:datastoreItem>
 </file>
@@ -39977,10 +39978,9 @@
 </file>
 
 <file path=customXml/itemProps3.xml><?xml version="1.0" encoding="utf-8"?>
-<ds:datastoreItem xmlns:ds="http://schemas.openxmlformats.org/officeDocument/2006/customXml" ds:itemID="{6C60251D-6FF0-4793-A20E-73F86C34C07D}">
+<ds:datastoreItem xmlns:ds="http://schemas.openxmlformats.org/officeDocument/2006/customXml" ds:itemID="{FB1BE96A-004D-462B-9683-1ED8D109FF11}">
   <ds:schemaRefs>
-    <ds:schemaRef ds:uri="http://schemas.microsoft.com/office/2006/metadata/properties"/>
-    <ds:schemaRef ds:uri="http://schemas.microsoft.com/office/infopath/2007/PartnerControls"/>
+    <ds:schemaRef ds:uri="http://schemas.microsoft.com/sharepoint/v3/contenttype/forms"/>
   </ds:schemaRefs>
 </ds:datastoreItem>
 </file>
</xml_diff>